<commit_message>
Fixed some presentation formatting
</commit_message>
<xml_diff>
--- a/Predicting Best Picture Nominees and Winners v1.0.pptx
+++ b/Predicting Best Picture Nominees and Winners v1.0.pptx
@@ -231,7 +231,7 @@
           <a:p>
             <a:fld id="{1C793F6D-6A86-4613-A871-E225E0C69E74}" type="datetimeFigureOut">
               <a:rPr lang="en-US" smtClean="0"/>
-              <a:t>10/8/15</a:t>
+              <a:t>10/12/2015</a:t>
             </a:fld>
             <a:endParaRPr lang="en-US"/>
           </a:p>
@@ -4913,12 +4913,12 @@
         <p:spPr>
           <a:xfrm>
             <a:off x="762000" y="4089400"/>
-            <a:ext cx="7620000" cy="913824"/>
+            <a:ext cx="7848600" cy="913824"/>
           </a:xfrm>
         </p:spPr>
         <p:txBody>
           <a:bodyPr>
-            <a:normAutofit/>
+            <a:normAutofit fontScale="90000"/>
           </a:bodyPr>
           <a:lstStyle/>
           <a:p>
@@ -5240,8 +5240,8 @@
         </p:nvSpPr>
         <p:spPr>
           <a:xfrm>
-            <a:off x="2438400" y="1537447"/>
-            <a:ext cx="4876800" cy="1877018"/>
+            <a:off x="2384612" y="1537447"/>
+            <a:ext cx="5029200" cy="1877018"/>
           </a:xfrm>
         </p:spPr>
         <p:txBody>
@@ -5445,8 +5445,8 @@
         </p:nvSpPr>
         <p:spPr>
           <a:xfrm>
-            <a:off x="2438400" y="3927992"/>
-            <a:ext cx="4876800" cy="1877018"/>
+            <a:off x="2384612" y="3927992"/>
+            <a:ext cx="5029200" cy="1877018"/>
           </a:xfrm>
           <a:prstGeom prst="rect">
             <a:avLst/>
@@ -5759,8 +5759,8 @@
         </p:nvSpPr>
         <p:spPr>
           <a:xfrm>
-            <a:off x="2514600" y="1669775"/>
-            <a:ext cx="6172200" cy="1116335"/>
+            <a:off x="2447365" y="1669775"/>
+            <a:ext cx="6400800" cy="1116335"/>
           </a:xfrm>
         </p:spPr>
         <p:txBody>
@@ -5780,15 +5780,7 @@
                   <a:srgbClr val="00B050"/>
                 </a:solidFill>
               </a:rPr>
-              <a:t>98% </a:t>
-            </a:r>
-            <a:r>
-              <a:rPr lang="en-US" b="1" dirty="0" smtClean="0">
-                <a:solidFill>
-                  <a:srgbClr val="00B050"/>
-                </a:solidFill>
-              </a:rPr>
-              <a:t>accurate</a:t>
+              <a:t>98% accurate</a:t>
             </a:r>
             <a:r>
               <a:rPr lang="en-US" b="1" dirty="0" smtClean="0"/>
@@ -6012,8 +6004,8 @@
         </p:nvSpPr>
         <p:spPr>
           <a:xfrm>
-            <a:off x="2514600" y="2882153"/>
-            <a:ext cx="6172200" cy="1165480"/>
+            <a:off x="2447364" y="2882153"/>
+            <a:ext cx="6414745" cy="1165480"/>
           </a:xfrm>
           <a:prstGeom prst="rect">
             <a:avLst/>
@@ -6214,8 +6206,8 @@
         </p:nvSpPr>
         <p:spPr>
           <a:xfrm>
-            <a:off x="2514600" y="4143653"/>
-            <a:ext cx="6172200" cy="1163521"/>
+            <a:off x="2447365" y="4143653"/>
+            <a:ext cx="6400800" cy="1163521"/>
           </a:xfrm>
           <a:prstGeom prst="rect">
             <a:avLst/>
@@ -6513,21 +6505,22 @@
       </p:grpSpPr>
       <p:sp>
         <p:nvSpPr>
-          <p:cNvPr id="13" name="Rectangle 12"/>
+          <p:cNvPr id="14" name="Rectangle 13"/>
           <p:cNvSpPr/>
           <p:nvPr/>
         </p:nvSpPr>
         <p:spPr>
           <a:xfrm>
-            <a:off x="0" y="5273138"/>
-            <a:ext cx="9144000" cy="808456"/>
+            <a:off x="0" y="3081857"/>
+            <a:ext cx="9144000" cy="1302026"/>
           </a:xfrm>
           <a:prstGeom prst="rect">
             <a:avLst/>
           </a:prstGeom>
           <a:solidFill>
-            <a:schemeClr val="bg1">
-              <a:lumMod val="95000"/>
+            <a:schemeClr val="accent3">
+              <a:lumMod val="20000"/>
+              <a:lumOff val="80000"/>
             </a:schemeClr>
           </a:solidFill>
           <a:ln>
@@ -6561,7 +6554,7 @@
                   <a:schemeClr val="tx1"/>
                 </a:solidFill>
               </a:rPr>
-              <a:t>Marginal	</a:t>
+              <a:t>             Decent		</a:t>
             </a:r>
             <a:endParaRPr lang="en-US" sz="2000" dirty="0">
               <a:solidFill>
@@ -6573,22 +6566,21 @@
       </p:sp>
       <p:sp>
         <p:nvSpPr>
-          <p:cNvPr id="12" name="Rectangle 11"/>
+          <p:cNvPr id="13" name="Rectangle 12"/>
           <p:cNvSpPr/>
           <p:nvPr/>
         </p:nvSpPr>
         <p:spPr>
           <a:xfrm>
-            <a:off x="0" y="4425020"/>
+            <a:off x="0" y="5273138"/>
             <a:ext cx="9144000" cy="808456"/>
           </a:xfrm>
           <a:prstGeom prst="rect">
             <a:avLst/>
           </a:prstGeom>
           <a:solidFill>
-            <a:schemeClr val="accent4">
-              <a:lumMod val="20000"/>
-              <a:lumOff val="80000"/>
+            <a:schemeClr val="bg1">
+              <a:lumMod val="95000"/>
             </a:schemeClr>
           </a:solidFill>
           <a:ln>
@@ -6622,7 +6614,7 @@
                   <a:schemeClr val="tx1"/>
                 </a:solidFill>
               </a:rPr>
-              <a:t>Gatekeepers	</a:t>
+              <a:t>Marginal	</a:t>
             </a:r>
             <a:endParaRPr lang="en-US" sz="2000" dirty="0">
               <a:solidFill>
@@ -6634,20 +6626,20 @@
       </p:sp>
       <p:sp>
         <p:nvSpPr>
-          <p:cNvPr id="11" name="Rectangle 10"/>
+          <p:cNvPr id="12" name="Rectangle 11"/>
           <p:cNvSpPr/>
           <p:nvPr/>
         </p:nvSpPr>
         <p:spPr>
           <a:xfrm>
-            <a:off x="0" y="3081857"/>
-            <a:ext cx="9144000" cy="1302026"/>
+            <a:off x="0" y="4425020"/>
+            <a:ext cx="9144000" cy="808456"/>
           </a:xfrm>
           <a:prstGeom prst="rect">
             <a:avLst/>
           </a:prstGeom>
           <a:solidFill>
-            <a:schemeClr val="accent3">
+            <a:schemeClr val="accent4">
               <a:lumMod val="20000"/>
               <a:lumOff val="80000"/>
             </a:schemeClr>
@@ -6683,23 +6675,7 @@
                   <a:schemeClr val="tx1"/>
                 </a:solidFill>
               </a:rPr>
-              <a:t>             </a:t>
-            </a:r>
-            <a:r>
-              <a:rPr lang="en-US" sz="2000" dirty="0" smtClean="0">
-                <a:solidFill>
-                  <a:schemeClr val="tx1"/>
-                </a:solidFill>
-              </a:rPr>
-              <a:t>   Decent</a:t>
-            </a:r>
-            <a:r>
-              <a:rPr lang="en-US" sz="2000" dirty="0" smtClean="0">
-                <a:solidFill>
-                  <a:schemeClr val="tx1"/>
-                </a:solidFill>
-              </a:rPr>
-              <a:t>		</a:t>
+              <a:t>Gatekeepers	</a:t>
             </a:r>
             <a:endParaRPr lang="en-US" sz="2000" dirty="0">
               <a:solidFill>
@@ -9607,15 +9583,7 @@
           <a:p>
             <a:r>
               <a:rPr lang="en-US" dirty="0" smtClean="0"/>
-              <a:t>The opinion of </a:t>
-            </a:r>
-            <a:r>
-              <a:rPr lang="en-US" dirty="0" smtClean="0"/>
-              <a:t>critics </a:t>
-            </a:r>
-            <a:r>
-              <a:rPr lang="en-US" dirty="0" smtClean="0"/>
-              <a:t>and the public </a:t>
+              <a:t>The opinion of critics and the public </a:t>
             </a:r>
             <a:br>
               <a:rPr lang="en-US" dirty="0" smtClean="0"/>

</xml_diff>